<commit_message>
projektni prijedlog prezentacija - dorade
</commit_message>
<xml_diff>
--- a/projektni_prijedlog_prezentacija_jkts.pptx
+++ b/projektni_prijedlog_prezentacija_jkts.pptx
@@ -6,11 +6,12 @@
   </p:sldMasterIdLst>
   <p:sldIdLst>
     <p:sldId id="256" r:id="rId2"/>
-    <p:sldId id="258" r:id="rId3"/>
-    <p:sldId id="261" r:id="rId4"/>
-    <p:sldId id="263" r:id="rId5"/>
-    <p:sldId id="259" r:id="rId6"/>
-    <p:sldId id="262" r:id="rId7"/>
+    <p:sldId id="264" r:id="rId3"/>
+    <p:sldId id="258" r:id="rId4"/>
+    <p:sldId id="261" r:id="rId5"/>
+    <p:sldId id="263" r:id="rId6"/>
+    <p:sldId id="259" r:id="rId7"/>
+    <p:sldId id="262" r:id="rId8"/>
   </p:sldIdLst>
   <p:sldSz cx="9144000" cy="6858000" type="screen4x3"/>
   <p:notesSz cx="6858000" cy="9144000"/>
@@ -6278,7 +6279,7 @@
           <a:p>
             <a:r>
               <a:rPr lang="hr-HR" b="1" dirty="0"/>
-              <a:t>Cilj i hipoteze istraživanja</a:t>
+              <a:t>Opis problema</a:t>
             </a:r>
             <a:endParaRPr lang="en-GB" dirty="0"/>
           </a:p>
@@ -6301,7 +6302,27 @@
           <a:p>
             <a:r>
               <a:rPr lang="hr-HR" dirty="0"/>
-              <a:t>odrediti klasifikacijski model koji će za zadanu instancu (klijenta banke) na osnovu toj instanci pridruženih značajki odrediti hoće li odabrani klijent dugoročno oročiti depozit u banci, prije uspostve samog poziva od strane pozivng centra</a:t>
+              <a:t>telemarketing </a:t>
+            </a:r>
+            <a:r>
+              <a:rPr lang="hr-HR"/>
+              <a:t>– oblik marketinške </a:t>
+            </a:r>
+            <a:r>
+              <a:rPr lang="hr-HR" dirty="0"/>
+              <a:t>kampanje u kojoj (banka) organizira pozivni centar iz kojeg upućuje pozive klijentima te im pokušava prodati uslugu</a:t>
+            </a:r>
+          </a:p>
+          <a:p>
+            <a:pPr marL="0" indent="0">
+              <a:buNone/>
+            </a:pPr>
+            <a:endParaRPr lang="hr-HR" dirty="0"/>
+          </a:p>
+          <a:p>
+            <a:r>
+              <a:rPr lang="hr-HR" dirty="0"/>
+              <a:t>cilj promatrane marketinške kampanje: dugoročno oročenje depozita u banci</a:t>
             </a:r>
             <a:endParaRPr lang="en-GB" dirty="0"/>
           </a:p>
@@ -6310,7 +6331,7 @@
     </p:spTree>
     <p:extLst>
       <p:ext uri="{BB962C8B-B14F-4D97-AF65-F5344CB8AC3E}">
-        <p14:creationId xmlns:p14="http://schemas.microsoft.com/office/powerpoint/2010/main" val="1834264092"/>
+        <p14:creationId xmlns:p14="http://schemas.microsoft.com/office/powerpoint/2010/main" val="1632596007"/>
       </p:ext>
     </p:extLst>
   </p:cSld>
@@ -6353,8 +6374,8 @@
           <a:lstStyle/>
           <a:p>
             <a:r>
-              <a:rPr lang="hr-HR" dirty="0"/>
-              <a:t>Dataset</a:t>
+              <a:rPr lang="hr-HR" b="1" dirty="0"/>
+              <a:t>Cilj i hipoteze istraživanja</a:t>
             </a:r>
             <a:endParaRPr lang="en-GB" dirty="0"/>
           </a:p>
@@ -6376,236 +6397,8 @@
           <a:lstStyle/>
           <a:p>
             <a:r>
-              <a:rPr lang="en-GB" i="1" dirty="0"/>
-              <a:t>Bank Marketing Data Set</a:t>
-            </a:r>
-            <a:r>
-              <a:rPr lang="hr-HR" i="1" dirty="0"/>
-              <a:t>                                           </a:t>
-            </a:r>
-            <a:r>
               <a:rPr lang="hr-HR" dirty="0"/>
-              <a:t>(</a:t>
-            </a:r>
-            <a:r>
-              <a:rPr lang="en-GB" dirty="0"/>
-              <a:t>UC Irvine Machine Learning Repository</a:t>
-            </a:r>
-            <a:r>
-              <a:rPr lang="hr-HR" dirty="0"/>
-              <a:t>)</a:t>
-            </a:r>
-          </a:p>
-          <a:p>
-            <a:r>
-              <a:rPr lang="en-GB" dirty="0"/>
-              <a:t>21 </a:t>
-            </a:r>
-            <a:r>
-              <a:rPr lang="en-GB" dirty="0" err="1"/>
-              <a:t>značajk</a:t>
-            </a:r>
-            <a:r>
-              <a:rPr lang="hr-HR" dirty="0"/>
-              <a:t>i podijeljenih u pet kategorija:</a:t>
-            </a:r>
-          </a:p>
-          <a:p>
-            <a:pPr lvl="2"/>
-            <a:r>
-              <a:rPr lang="en-GB" dirty="0" err="1"/>
-              <a:t>demografski</a:t>
-            </a:r>
-            <a:r>
-              <a:rPr lang="en-GB" dirty="0"/>
-              <a:t> </a:t>
-            </a:r>
-            <a:r>
-              <a:rPr lang="en-GB" dirty="0" err="1"/>
-              <a:t>podatci</a:t>
-            </a:r>
-            <a:r>
-              <a:rPr lang="en-GB" dirty="0"/>
-              <a:t> o </a:t>
-            </a:r>
-            <a:r>
-              <a:rPr lang="en-GB" dirty="0" err="1"/>
-              <a:t>klijentu</a:t>
-            </a:r>
-            <a:r>
-              <a:rPr lang="en-GB" dirty="0"/>
-              <a:t> (DP)</a:t>
-            </a:r>
-            <a:endParaRPr lang="hr-HR" dirty="0"/>
-          </a:p>
-          <a:p>
-            <a:pPr lvl="2"/>
-            <a:r>
-              <a:rPr lang="en-GB" dirty="0" err="1"/>
-              <a:t>klijentove</a:t>
-            </a:r>
-            <a:r>
-              <a:rPr lang="en-GB" dirty="0"/>
-              <a:t> </a:t>
-            </a:r>
-            <a:r>
-              <a:rPr lang="en-GB" dirty="0" err="1"/>
-              <a:t>financijske</a:t>
-            </a:r>
-            <a:r>
-              <a:rPr lang="en-GB" dirty="0"/>
-              <a:t> </a:t>
-            </a:r>
-            <a:r>
-              <a:rPr lang="en-GB" dirty="0" err="1"/>
-              <a:t>karakteristike</a:t>
-            </a:r>
-            <a:r>
-              <a:rPr lang="en-GB" dirty="0"/>
-              <a:t> (FK)</a:t>
-            </a:r>
-            <a:endParaRPr lang="hr-HR" dirty="0"/>
-          </a:p>
-          <a:p>
-            <a:pPr lvl="2"/>
-            <a:r>
-              <a:rPr lang="en-GB" dirty="0" err="1"/>
-              <a:t>podatci</a:t>
-            </a:r>
-            <a:r>
-              <a:rPr lang="en-GB" dirty="0"/>
-              <a:t> </a:t>
-            </a:r>
-            <a:r>
-              <a:rPr lang="en-GB" dirty="0" err="1"/>
-              <a:t>vezani</a:t>
-            </a:r>
-            <a:r>
-              <a:rPr lang="en-GB" dirty="0"/>
-              <a:t> </a:t>
-            </a:r>
-            <a:r>
-              <a:rPr lang="en-GB" dirty="0" err="1"/>
-              <a:t>uz</a:t>
-            </a:r>
-            <a:r>
-              <a:rPr lang="en-GB" dirty="0"/>
-              <a:t> </a:t>
-            </a:r>
-            <a:r>
-              <a:rPr lang="en-GB" dirty="0" err="1"/>
-              <a:t>trenutnu</a:t>
-            </a:r>
-            <a:r>
-              <a:rPr lang="en-GB" dirty="0"/>
-              <a:t> </a:t>
-            </a:r>
-            <a:r>
-              <a:rPr lang="en-GB" dirty="0" err="1"/>
-              <a:t>marketinšku</a:t>
-            </a:r>
-            <a:r>
-              <a:rPr lang="en-GB" dirty="0"/>
-              <a:t> </a:t>
-            </a:r>
-            <a:r>
-              <a:rPr lang="en-GB" dirty="0" err="1"/>
-              <a:t>kampanju</a:t>
-            </a:r>
-            <a:r>
-              <a:rPr lang="en-GB" dirty="0"/>
-              <a:t> </a:t>
-            </a:r>
-            <a:r>
-              <a:rPr lang="en-GB" dirty="0" err="1"/>
-              <a:t>banke</a:t>
-            </a:r>
-            <a:r>
-              <a:rPr lang="en-GB" dirty="0"/>
-              <a:t> (TMK)</a:t>
-            </a:r>
-            <a:endParaRPr lang="hr-HR" dirty="0"/>
-          </a:p>
-          <a:p>
-            <a:pPr lvl="2"/>
-            <a:r>
-              <a:rPr lang="en-GB" dirty="0" err="1"/>
-              <a:t>podatci</a:t>
-            </a:r>
-            <a:r>
-              <a:rPr lang="en-GB" dirty="0"/>
-              <a:t> </a:t>
-            </a:r>
-            <a:r>
-              <a:rPr lang="en-GB" dirty="0" err="1"/>
-              <a:t>vezani</a:t>
-            </a:r>
-            <a:r>
-              <a:rPr lang="en-GB" dirty="0"/>
-              <a:t> </a:t>
-            </a:r>
-            <a:r>
-              <a:rPr lang="en-GB" dirty="0" err="1"/>
-              <a:t>uz</a:t>
-            </a:r>
-            <a:r>
-              <a:rPr lang="en-GB" dirty="0"/>
-              <a:t> </a:t>
-            </a:r>
-            <a:r>
-              <a:rPr lang="en-GB" dirty="0" err="1"/>
-              <a:t>prethodnu</a:t>
-            </a:r>
-            <a:r>
-              <a:rPr lang="en-GB" dirty="0"/>
-              <a:t> </a:t>
-            </a:r>
-            <a:r>
-              <a:rPr lang="en-GB" dirty="0" err="1"/>
-              <a:t>marketinšku</a:t>
-            </a:r>
-            <a:r>
-              <a:rPr lang="en-GB" dirty="0"/>
-              <a:t> </a:t>
-            </a:r>
-            <a:r>
-              <a:rPr lang="en-GB" dirty="0" err="1"/>
-              <a:t>kampanju</a:t>
-            </a:r>
-            <a:r>
-              <a:rPr lang="en-GB" dirty="0"/>
-              <a:t> (PMK)</a:t>
-            </a:r>
-            <a:endParaRPr lang="hr-HR" dirty="0"/>
-          </a:p>
-          <a:p>
-            <a:pPr lvl="2"/>
-            <a:r>
-              <a:rPr lang="en-GB" dirty="0" err="1"/>
-              <a:t>socioekonomska</a:t>
-            </a:r>
-            <a:r>
-              <a:rPr lang="en-GB" dirty="0"/>
-              <a:t> </a:t>
-            </a:r>
-            <a:r>
-              <a:rPr lang="en-GB" dirty="0" err="1"/>
-              <a:t>situacija</a:t>
-            </a:r>
-            <a:r>
-              <a:rPr lang="en-GB" dirty="0"/>
-              <a:t> (SES)</a:t>
-            </a:r>
-            <a:endParaRPr lang="hr-HR" dirty="0"/>
-          </a:p>
-          <a:p>
-            <a:r>
-              <a:rPr lang="en-GB" dirty="0"/>
-              <a:t>45212 </a:t>
-            </a:r>
-            <a:r>
-              <a:rPr lang="en-GB" dirty="0" err="1"/>
-              <a:t>instanci</a:t>
+              <a:t>odrediti klasifikacijski model koji će za zadanu instancu (klijenta banke) na osnovu toj instanci pridruženih značajki odrediti hoće li odabrani klijent dugoročno oročiti depozit u banci, prije uspostve samog poziva od strane pozivng centra</a:t>
             </a:r>
             <a:endParaRPr lang="en-GB" dirty="0"/>
           </a:p>
@@ -6614,7 +6407,7 @@
     </p:spTree>
     <p:extLst>
       <p:ext uri="{BB962C8B-B14F-4D97-AF65-F5344CB8AC3E}">
-        <p14:creationId xmlns:p14="http://schemas.microsoft.com/office/powerpoint/2010/main" val="1014671628"/>
+        <p14:creationId xmlns:p14="http://schemas.microsoft.com/office/powerpoint/2010/main" val="1834264092"/>
       </p:ext>
     </p:extLst>
   </p:cSld>
@@ -6658,7 +6451,7 @@
           <a:p>
             <a:r>
               <a:rPr lang="hr-HR" dirty="0"/>
-              <a:t>Metodologija i plan istraživanja</a:t>
+              <a:t>Dataset</a:t>
             </a:r>
             <a:endParaRPr lang="en-GB" dirty="0"/>
           </a:p>
@@ -6676,58 +6469,77 @@
         </p:nvSpPr>
         <p:spPr/>
         <p:txBody>
-          <a:bodyPr>
-            <a:normAutofit lnSpcReduction="10000"/>
-          </a:bodyPr>
-          <a:lstStyle/>
-          <a:p>
+          <a:bodyPr/>
+          <a:lstStyle/>
+          <a:p>
+            <a:r>
+              <a:rPr lang="en-GB" i="1" dirty="0"/>
+              <a:t>Bank Marketing Data Set</a:t>
+            </a:r>
+            <a:r>
+              <a:rPr lang="hr-HR" i="1" dirty="0"/>
+              <a:t>                                           </a:t>
+            </a:r>
             <a:r>
               <a:rPr lang="hr-HR" dirty="0"/>
-              <a:t>Modeli i njihova implementacija u </a:t>
-            </a:r>
-            <a:r>
-              <a:rPr lang="hr-HR" dirty="0" err="1"/>
-              <a:t>Pythonu</a:t>
-            </a:r>
-            <a:endParaRPr lang="hr-HR" dirty="0"/>
-          </a:p>
-          <a:p>
-            <a:pPr lvl="1"/>
+              <a:t>(</a:t>
+            </a:r>
+            <a:r>
+              <a:rPr lang="en-GB" dirty="0"/>
+              <a:t>UC Irvine Machine Learning Repository</a:t>
+            </a:r>
             <a:r>
               <a:rPr lang="hr-HR" dirty="0"/>
-              <a:t>Naivni </a:t>
-            </a:r>
-            <a:r>
-              <a:rPr lang="hr-HR" dirty="0" err="1"/>
-              <a:t>Bayesov</a:t>
+              <a:t>)</a:t>
+            </a:r>
+          </a:p>
+          <a:p>
+            <a:r>
+              <a:rPr lang="en-GB" dirty="0"/>
+              <a:t>21 </a:t>
+            </a:r>
+            <a:r>
+              <a:rPr lang="en-GB" dirty="0" err="1"/>
+              <a:t>značajk</a:t>
             </a:r>
             <a:r>
               <a:rPr lang="hr-HR" dirty="0"/>
-              <a:t> </a:t>
-            </a:r>
-            <a:r>
-              <a:rPr lang="hr-HR" dirty="0" err="1"/>
-              <a:t>kvantifikator</a:t>
-            </a:r>
-            <a:r>
-              <a:rPr lang="hr-HR" dirty="0"/>
-              <a:t> – </a:t>
-            </a:r>
-            <a:r>
-              <a:rPr lang="en-GB" i="1" dirty="0" err="1"/>
-              <a:t>sklearn.naive_bayes.GaussianNB</a:t>
+              <a:t>i podijeljenih u pet kategorija:</a:t>
+            </a:r>
+          </a:p>
+          <a:p>
+            <a:pPr lvl="2"/>
+            <a:r>
+              <a:rPr lang="en-GB" dirty="0" err="1"/>
+              <a:t>demografski</a:t>
             </a:r>
             <a:r>
               <a:rPr lang="en-GB" dirty="0"/>
               <a:t> </a:t>
             </a:r>
+            <a:r>
+              <a:rPr lang="en-GB" dirty="0" err="1"/>
+              <a:t>podatci</a:t>
+            </a:r>
+            <a:r>
+              <a:rPr lang="en-GB" dirty="0"/>
+              <a:t> o </a:t>
+            </a:r>
+            <a:r>
+              <a:rPr lang="en-GB" dirty="0" err="1"/>
+              <a:t>klijentu</a:t>
+            </a:r>
+            <a:r>
+              <a:rPr lang="en-GB" dirty="0"/>
+              <a:t> (DP)</a:t>
+            </a:r>
             <a:endParaRPr lang="hr-HR" dirty="0"/>
           </a:p>
           <a:p>
-            <a:pPr lvl="1"/>
+            <a:pPr lvl="2"/>
             <a:r>
               <a:rPr lang="en-GB" dirty="0" err="1"/>
-              <a:t>Slučajne</a:t>
+              <a:t>klijentove</a:t>
             </a:r>
             <a:r>
               <a:rPr lang="en-GB" dirty="0"/>
@@ -6735,39 +6547,27 @@
             </a:r>
             <a:r>
               <a:rPr lang="en-GB" dirty="0" err="1"/>
-              <a:t>šume</a:t>
-            </a:r>
-            <a:r>
-              <a:rPr lang="hr-HR" dirty="0"/>
-              <a:t> - </a:t>
-            </a:r>
-            <a:r>
-              <a:rPr lang="en-GB" i="1" dirty="0" err="1"/>
-              <a:t>sklearn.ensemble.RandomForestClassifier</a:t>
+              <a:t>financijske</a:t>
             </a:r>
             <a:r>
               <a:rPr lang="en-GB" dirty="0"/>
               <a:t> </a:t>
             </a:r>
+            <a:r>
+              <a:rPr lang="en-GB" dirty="0" err="1"/>
+              <a:t>karakteristike</a:t>
+            </a:r>
+            <a:r>
+              <a:rPr lang="en-GB" dirty="0"/>
+              <a:t> (FK)</a:t>
+            </a:r>
             <a:endParaRPr lang="hr-HR" dirty="0"/>
           </a:p>
           <a:p>
-            <a:pPr lvl="1"/>
-            <a:r>
-              <a:rPr lang="hr-HR" dirty="0"/>
-              <a:t>S</a:t>
-            </a:r>
+            <a:pPr lvl="2"/>
             <a:r>
               <a:rPr lang="en-GB" dirty="0" err="1"/>
-              <a:t>troj</a:t>
-            </a:r>
-            <a:r>
-              <a:rPr lang="en-GB" dirty="0"/>
-              <a:t> s </a:t>
-            </a:r>
-            <a:r>
-              <a:rPr lang="en-GB" dirty="0" err="1"/>
-              <a:t>potpornim</a:t>
+              <a:t>podatci</a:t>
             </a:r>
             <a:r>
               <a:rPr lang="en-GB" dirty="0"/>
@@ -6775,31 +6575,23 @@
             </a:r>
             <a:r>
               <a:rPr lang="en-GB" dirty="0" err="1"/>
-              <a:t>vektorima</a:t>
+              <a:t>vezani</a:t>
             </a:r>
             <a:r>
               <a:rPr lang="en-GB" dirty="0"/>
               <a:t> </a:t>
             </a:r>
             <a:r>
-              <a:rPr lang="hr-HR" dirty="0"/>
-              <a:t>- </a:t>
-            </a:r>
-            <a:r>
-              <a:rPr lang="en-GB" i="1" dirty="0" err="1"/>
-              <a:t>sklearn.svm.SVC</a:t>
+              <a:rPr lang="en-GB" dirty="0" err="1"/>
+              <a:t>uz</a:t>
             </a:r>
             <a:r>
               <a:rPr lang="en-GB" dirty="0"/>
               <a:t> </a:t>
             </a:r>
-            <a:endParaRPr lang="hr-HR" dirty="0"/>
-          </a:p>
-          <a:p>
-            <a:pPr lvl="1"/>
             <a:r>
               <a:rPr lang="en-GB" dirty="0" err="1"/>
-              <a:t>Stabla</a:t>
+              <a:t>trenutnu</a:t>
             </a:r>
             <a:r>
               <a:rPr lang="en-GB" dirty="0"/>
@@ -6807,91 +6599,119 @@
             </a:r>
             <a:r>
               <a:rPr lang="en-GB" dirty="0" err="1"/>
-              <a:t>odlučivanja</a:t>
-            </a:r>
-            <a:r>
-              <a:rPr lang="hr-HR" dirty="0"/>
-              <a:t> - </a:t>
-            </a:r>
-            <a:r>
-              <a:rPr lang="en-GB" i="1" dirty="0" err="1"/>
-              <a:t>sklearn.tree.DecisionTreeClassifie</a:t>
-            </a:r>
-            <a:endParaRPr lang="hr-HR" i="1" dirty="0"/>
-          </a:p>
-          <a:p>
-            <a:r>
-              <a:rPr lang="hr-HR" i="1" dirty="0"/>
-              <a:t>Metrika </a:t>
-            </a:r>
-          </a:p>
-          <a:p>
-            <a:pPr lvl="1"/>
-            <a:r>
-              <a:rPr lang="hr-HR" i="1" dirty="0" err="1"/>
-              <a:t>Receiver</a:t>
-            </a:r>
-            <a:r>
-              <a:rPr lang="hr-HR" i="1" dirty="0"/>
+              <a:t>marketinšku</a:t>
+            </a:r>
+            <a:r>
+              <a:rPr lang="en-GB" dirty="0"/>
               <a:t> </a:t>
             </a:r>
             <a:r>
-              <a:rPr lang="hr-HR" i="1" dirty="0" err="1"/>
-              <a:t>Operating</a:t>
-            </a:r>
-            <a:r>
-              <a:rPr lang="hr-HR" i="1" dirty="0"/>
+              <a:rPr lang="en-GB" dirty="0" err="1"/>
+              <a:t>kampanju</a:t>
+            </a:r>
+            <a:r>
+              <a:rPr lang="en-GB" dirty="0"/>
               <a:t> </a:t>
             </a:r>
             <a:r>
-              <a:rPr lang="hr-HR" i="1" dirty="0" err="1"/>
-              <a:t>Characheristic</a:t>
-            </a:r>
-            <a:r>
-              <a:rPr lang="hr-HR" i="1" dirty="0"/>
-              <a:t> (ROC) </a:t>
-            </a:r>
+              <a:rPr lang="en-GB" dirty="0" err="1"/>
+              <a:t>banke</a:t>
+            </a:r>
+            <a:r>
+              <a:rPr lang="en-GB" dirty="0"/>
+              <a:t> (TMK)</a:t>
+            </a:r>
+            <a:endParaRPr lang="hr-HR" dirty="0"/>
           </a:p>
           <a:p>
             <a:pPr lvl="2"/>
             <a:r>
-              <a:rPr lang="hr-HR" i="1" dirty="0"/>
-              <a:t>nebalansirani </a:t>
-            </a:r>
-            <a:r>
-              <a:rPr lang="hr-HR" i="1" dirty="0" err="1"/>
-              <a:t>podaciž</a:t>
-            </a:r>
-            <a:endParaRPr lang="hr-HR" i="1" dirty="0"/>
-          </a:p>
-          <a:p>
-            <a:r>
-              <a:rPr lang="hr-HR" i="1" dirty="0"/>
-              <a:t>Cilj</a:t>
-            </a:r>
-          </a:p>
-          <a:p>
-            <a:pPr lvl="1"/>
-            <a:r>
-              <a:rPr lang="hr-HR" i="1" dirty="0"/>
-              <a:t>Usporedba između modela SU i usporedba s </a:t>
-            </a:r>
-            <a:r>
-              <a:rPr lang="hr-HR" i="1" dirty="0" err="1"/>
-              <a:t>orginalnim</a:t>
-            </a:r>
-            <a:r>
-              <a:rPr lang="hr-HR" i="1"/>
-              <a:t> radom </a:t>
-            </a:r>
-            <a:endParaRPr lang="hr-HR" i="1" dirty="0"/>
+              <a:rPr lang="en-GB" dirty="0" err="1"/>
+              <a:t>podatci</a:t>
+            </a:r>
+            <a:r>
+              <a:rPr lang="en-GB" dirty="0"/>
+              <a:t> </a:t>
+            </a:r>
+            <a:r>
+              <a:rPr lang="en-GB" dirty="0" err="1"/>
+              <a:t>vezani</a:t>
+            </a:r>
+            <a:r>
+              <a:rPr lang="en-GB" dirty="0"/>
+              <a:t> </a:t>
+            </a:r>
+            <a:r>
+              <a:rPr lang="en-GB" dirty="0" err="1"/>
+              <a:t>uz</a:t>
+            </a:r>
+            <a:r>
+              <a:rPr lang="en-GB" dirty="0"/>
+              <a:t> </a:t>
+            </a:r>
+            <a:r>
+              <a:rPr lang="en-GB" dirty="0" err="1"/>
+              <a:t>prethodnu</a:t>
+            </a:r>
+            <a:r>
+              <a:rPr lang="en-GB" dirty="0"/>
+              <a:t> </a:t>
+            </a:r>
+            <a:r>
+              <a:rPr lang="en-GB" dirty="0" err="1"/>
+              <a:t>marketinšku</a:t>
+            </a:r>
+            <a:r>
+              <a:rPr lang="en-GB" dirty="0"/>
+              <a:t> </a:t>
+            </a:r>
+            <a:r>
+              <a:rPr lang="en-GB" dirty="0" err="1"/>
+              <a:t>kampanju</a:t>
+            </a:r>
+            <a:r>
+              <a:rPr lang="en-GB" dirty="0"/>
+              <a:t> (PMK)</a:t>
+            </a:r>
+            <a:endParaRPr lang="hr-HR" dirty="0"/>
+          </a:p>
+          <a:p>
+            <a:pPr lvl="2"/>
+            <a:r>
+              <a:rPr lang="en-GB" dirty="0" err="1"/>
+              <a:t>socioekonomska</a:t>
+            </a:r>
+            <a:r>
+              <a:rPr lang="en-GB" dirty="0"/>
+              <a:t> </a:t>
+            </a:r>
+            <a:r>
+              <a:rPr lang="en-GB" dirty="0" err="1"/>
+              <a:t>situacija</a:t>
+            </a:r>
+            <a:r>
+              <a:rPr lang="en-GB" dirty="0"/>
+              <a:t> (SES)</a:t>
+            </a:r>
+            <a:endParaRPr lang="hr-HR" dirty="0"/>
+          </a:p>
+          <a:p>
+            <a:r>
+              <a:rPr lang="en-GB" dirty="0"/>
+              <a:t>45212 </a:t>
+            </a:r>
+            <a:r>
+              <a:rPr lang="en-GB" dirty="0" err="1"/>
+              <a:t>instanci</a:t>
+            </a:r>
+            <a:endParaRPr lang="en-GB" dirty="0"/>
           </a:p>
         </p:txBody>
       </p:sp>
     </p:spTree>
     <p:extLst>
       <p:ext uri="{BB962C8B-B14F-4D97-AF65-F5344CB8AC3E}">
-        <p14:creationId xmlns:p14="http://schemas.microsoft.com/office/powerpoint/2010/main" val="3553769782"/>
+        <p14:creationId xmlns:p14="http://schemas.microsoft.com/office/powerpoint/2010/main" val="1014671628"/>
       </p:ext>
     </p:extLst>
   </p:cSld>
@@ -6935,6 +6755,289 @@
           <a:p>
             <a:r>
               <a:rPr lang="hr-HR" dirty="0"/>
+              <a:t>Metodologija i plan istraživanja</a:t>
+            </a:r>
+            <a:endParaRPr lang="en-GB" dirty="0"/>
+          </a:p>
+        </p:txBody>
+      </p:sp>
+      <p:sp>
+        <p:nvSpPr>
+          <p:cNvPr id="5" name="Content Placeholder 4">
+            <a:extLst>
+              <a:ext uri="{FF2B5EF4-FFF2-40B4-BE49-F238E27FC236}">
+                <a16:creationId xmlns:a16="http://schemas.microsoft.com/office/drawing/2014/main" id="{E132D4DB-FDE8-42DC-912F-3EB73CF52485}"/>
+              </a:ext>
+            </a:extLst>
+          </p:cNvPr>
+          <p:cNvSpPr>
+            <a:spLocks noGrp="1"/>
+          </p:cNvSpPr>
+          <p:nvPr>
+            <p:ph sz="quarter" idx="1"/>
+          </p:nvPr>
+        </p:nvSpPr>
+        <p:spPr/>
+        <p:txBody>
+          <a:bodyPr>
+            <a:normAutofit lnSpcReduction="10000"/>
+          </a:bodyPr>
+          <a:lstStyle/>
+          <a:p>
+            <a:r>
+              <a:rPr lang="hr-HR" dirty="0"/>
+              <a:t>Modeli i njihova implementacija u </a:t>
+            </a:r>
+            <a:r>
+              <a:rPr lang="hr-HR" dirty="0" err="1"/>
+              <a:t>Pythonu</a:t>
+            </a:r>
+            <a:endParaRPr lang="hr-HR" dirty="0"/>
+          </a:p>
+          <a:p>
+            <a:pPr lvl="1"/>
+            <a:r>
+              <a:rPr lang="hr-HR" dirty="0"/>
+              <a:t>Naivni </a:t>
+            </a:r>
+            <a:r>
+              <a:rPr lang="hr-HR" dirty="0" err="1"/>
+              <a:t>Bayesov</a:t>
+            </a:r>
+            <a:r>
+              <a:rPr lang="hr-HR" dirty="0"/>
+              <a:t> </a:t>
+            </a:r>
+            <a:r>
+              <a:rPr lang="hr-HR" dirty="0" err="1"/>
+              <a:t>kvantifikator</a:t>
+            </a:r>
+            <a:r>
+              <a:rPr lang="hr-HR" dirty="0"/>
+              <a:t> – </a:t>
+            </a:r>
+            <a:r>
+              <a:rPr lang="en-GB" i="1" dirty="0" err="1"/>
+              <a:t>sklearn.naive_bayes.GaussianNB</a:t>
+            </a:r>
+            <a:r>
+              <a:rPr lang="en-GB" dirty="0"/>
+              <a:t> </a:t>
+            </a:r>
+            <a:endParaRPr lang="hr-HR" dirty="0"/>
+          </a:p>
+          <a:p>
+            <a:pPr lvl="1"/>
+            <a:r>
+              <a:rPr lang="en-GB" dirty="0" err="1"/>
+              <a:t>Slučajne</a:t>
+            </a:r>
+            <a:r>
+              <a:rPr lang="en-GB" dirty="0"/>
+              <a:t> </a:t>
+            </a:r>
+            <a:r>
+              <a:rPr lang="en-GB" dirty="0" err="1"/>
+              <a:t>šume</a:t>
+            </a:r>
+            <a:r>
+              <a:rPr lang="hr-HR" dirty="0"/>
+              <a:t> - </a:t>
+            </a:r>
+            <a:r>
+              <a:rPr lang="en-GB" i="1" dirty="0" err="1"/>
+              <a:t>sklearn.ensemble.RandomForestClassifier</a:t>
+            </a:r>
+            <a:r>
+              <a:rPr lang="en-GB" dirty="0"/>
+              <a:t> </a:t>
+            </a:r>
+            <a:endParaRPr lang="hr-HR" dirty="0"/>
+          </a:p>
+          <a:p>
+            <a:pPr lvl="1"/>
+            <a:r>
+              <a:rPr lang="hr-HR" dirty="0"/>
+              <a:t>S</a:t>
+            </a:r>
+            <a:r>
+              <a:rPr lang="en-GB" dirty="0" err="1"/>
+              <a:t>troj</a:t>
+            </a:r>
+            <a:r>
+              <a:rPr lang="en-GB" dirty="0"/>
+              <a:t> s </a:t>
+            </a:r>
+            <a:r>
+              <a:rPr lang="en-GB" dirty="0" err="1"/>
+              <a:t>potpornim</a:t>
+            </a:r>
+            <a:r>
+              <a:rPr lang="en-GB" dirty="0"/>
+              <a:t> </a:t>
+            </a:r>
+            <a:r>
+              <a:rPr lang="en-GB" dirty="0" err="1"/>
+              <a:t>vektorima</a:t>
+            </a:r>
+            <a:r>
+              <a:rPr lang="en-GB" dirty="0"/>
+              <a:t> </a:t>
+            </a:r>
+            <a:r>
+              <a:rPr lang="hr-HR" dirty="0"/>
+              <a:t>- </a:t>
+            </a:r>
+            <a:r>
+              <a:rPr lang="en-GB" i="1" dirty="0" err="1"/>
+              <a:t>sklearn.svm.SVC</a:t>
+            </a:r>
+            <a:r>
+              <a:rPr lang="en-GB" dirty="0"/>
+              <a:t> </a:t>
+            </a:r>
+            <a:endParaRPr lang="hr-HR" dirty="0"/>
+          </a:p>
+          <a:p>
+            <a:pPr lvl="1"/>
+            <a:r>
+              <a:rPr lang="en-GB" dirty="0" err="1"/>
+              <a:t>Stabla</a:t>
+            </a:r>
+            <a:r>
+              <a:rPr lang="en-GB" dirty="0"/>
+              <a:t> </a:t>
+            </a:r>
+            <a:r>
+              <a:rPr lang="en-GB" dirty="0" err="1"/>
+              <a:t>odlučivanja</a:t>
+            </a:r>
+            <a:r>
+              <a:rPr lang="hr-HR" dirty="0"/>
+              <a:t> - </a:t>
+            </a:r>
+            <a:r>
+              <a:rPr lang="en-GB" i="1" dirty="0" err="1"/>
+              <a:t>sklearn.tree.DecisionTreeClassifie</a:t>
+            </a:r>
+            <a:endParaRPr lang="hr-HR" i="1" dirty="0"/>
+          </a:p>
+          <a:p>
+            <a:r>
+              <a:rPr lang="hr-HR" i="1" dirty="0"/>
+              <a:t>Metrika </a:t>
+            </a:r>
+          </a:p>
+          <a:p>
+            <a:pPr lvl="1"/>
+            <a:r>
+              <a:rPr lang="hr-HR" i="1" dirty="0" err="1"/>
+              <a:t>Receiver</a:t>
+            </a:r>
+            <a:r>
+              <a:rPr lang="hr-HR" i="1" dirty="0"/>
+              <a:t> </a:t>
+            </a:r>
+            <a:r>
+              <a:rPr lang="hr-HR" i="1" dirty="0" err="1"/>
+              <a:t>Operating</a:t>
+            </a:r>
+            <a:r>
+              <a:rPr lang="hr-HR" i="1" dirty="0"/>
+              <a:t> </a:t>
+            </a:r>
+            <a:r>
+              <a:rPr lang="hr-HR" i="1" dirty="0" err="1"/>
+              <a:t>Characheristic</a:t>
+            </a:r>
+            <a:r>
+              <a:rPr lang="hr-HR" i="1" dirty="0"/>
+              <a:t> (ROC) </a:t>
+            </a:r>
+          </a:p>
+          <a:p>
+            <a:pPr lvl="2"/>
+            <a:r>
+              <a:rPr lang="hr-HR" i="1" dirty="0"/>
+              <a:t>nebalansirani podaci</a:t>
+            </a:r>
+          </a:p>
+          <a:p>
+            <a:r>
+              <a:rPr lang="hr-HR" i="1" dirty="0"/>
+              <a:t>Cilj</a:t>
+            </a:r>
+          </a:p>
+          <a:p>
+            <a:pPr lvl="1"/>
+            <a:r>
+              <a:rPr lang="hr-HR" i="1" dirty="0"/>
+              <a:t>Usporedba između modela SU i usporedba s </a:t>
+            </a:r>
+            <a:r>
+              <a:rPr lang="hr-HR" i="1" dirty="0" err="1"/>
+              <a:t>orginalnim</a:t>
+            </a:r>
+            <a:r>
+              <a:rPr lang="hr-HR" i="1" dirty="0"/>
+              <a:t> radom </a:t>
+            </a:r>
+          </a:p>
+          <a:p>
+            <a:pPr marL="0" indent="0">
+              <a:buNone/>
+            </a:pPr>
+            <a:endParaRPr lang="hr-HR" dirty="0"/>
+          </a:p>
+        </p:txBody>
+      </p:sp>
+    </p:spTree>
+    <p:extLst>
+      <p:ext uri="{BB962C8B-B14F-4D97-AF65-F5344CB8AC3E}">
+        <p14:creationId xmlns:p14="http://schemas.microsoft.com/office/powerpoint/2010/main" val="3553769782"/>
+      </p:ext>
+    </p:extLst>
+  </p:cSld>
+  <p:clrMapOvr>
+    <a:masterClrMapping/>
+  </p:clrMapOvr>
+</p:sld>
+</file>
+
+<file path=ppt/slides/slide6.xml><?xml version="1.0" encoding="utf-8"?>
+<p:sld xmlns:a="http://schemas.openxmlformats.org/drawingml/2006/main" xmlns:r="http://schemas.openxmlformats.org/officeDocument/2006/relationships" xmlns:p="http://schemas.openxmlformats.org/presentationml/2006/main">
+  <p:cSld>
+    <p:spTree>
+      <p:nvGrpSpPr>
+        <p:cNvPr id="1" name=""/>
+        <p:cNvGrpSpPr/>
+        <p:nvPr/>
+      </p:nvGrpSpPr>
+      <p:grpSpPr>
+        <a:xfrm>
+          <a:off x="0" y="0"/>
+          <a:ext cx="0" cy="0"/>
+          <a:chOff x="0" y="0"/>
+          <a:chExt cx="0" cy="0"/>
+        </a:xfrm>
+      </p:grpSpPr>
+      <p:sp>
+        <p:nvSpPr>
+          <p:cNvPr id="2" name="Title 1"/>
+          <p:cNvSpPr>
+            <a:spLocks noGrp="1"/>
+          </p:cNvSpPr>
+          <p:nvPr>
+            <p:ph type="title"/>
+          </p:nvPr>
+        </p:nvSpPr>
+        <p:spPr/>
+        <p:txBody>
+          <a:bodyPr/>
+          <a:lstStyle/>
+          <a:p>
+            <a:r>
+              <a:rPr lang="hr-HR" dirty="0"/>
               <a:t>Literatura</a:t>
             </a:r>
             <a:endParaRPr lang="en-GB" dirty="0"/>
@@ -7381,7 +7484,7 @@
 </p:sld>
 </file>
 
-<file path=ppt/slides/slide6.xml><?xml version="1.0" encoding="utf-8"?>
+<file path=ppt/slides/slide7.xml><?xml version="1.0" encoding="utf-8"?>
 <p:sld xmlns:a="http://schemas.openxmlformats.org/drawingml/2006/main" xmlns:r="http://schemas.openxmlformats.org/officeDocument/2006/relationships" xmlns:p="http://schemas.openxmlformats.org/presentationml/2006/main">
   <p:cSld>
     <p:spTree>

</xml_diff>